<commit_message>
updates to graph queries
</commit_message>
<xml_diff>
--- a/GAB2019-BLR/Az-TipsAndTricks.pptx
+++ b/GAB2019-BLR/Az-TipsAndTricks.pptx
@@ -262,7 +262,7 @@
             <a:fld id="{48A87A34-81AB-432B-8DAE-1953F412C126}" type="datetimeFigureOut">
               <a:rPr lang="en-US" smtClean="0"/>
               <a:pPr/>
-              <a:t>4/26/2019</a:t>
+              <a:t>4/27/2019</a:t>
             </a:fld>
             <a:endParaRPr lang="en-US" dirty="0"/>
           </a:p>
@@ -473,7 +473,7 @@
           <a:p>
             <a:fld id="{48A87A34-81AB-432B-8DAE-1953F412C126}" type="datetimeFigureOut">
               <a:rPr lang="en-US" smtClean="0"/>
-              <a:t>4/26/2019</a:t>
+              <a:t>4/27/2019</a:t>
             </a:fld>
             <a:endParaRPr lang="en-US" dirty="0"/>
           </a:p>
@@ -688,7 +688,7 @@
           <a:p>
             <a:fld id="{48A87A34-81AB-432B-8DAE-1953F412C126}" type="datetimeFigureOut">
               <a:rPr lang="en-US" smtClean="0"/>
-              <a:t>4/26/2019</a:t>
+              <a:t>4/27/2019</a:t>
             </a:fld>
             <a:endParaRPr lang="en-US" dirty="0"/>
           </a:p>
@@ -889,7 +889,7 @@
           <a:p>
             <a:fld id="{48A87A34-81AB-432B-8DAE-1953F412C126}" type="datetimeFigureOut">
               <a:rPr lang="en-US" smtClean="0"/>
-              <a:t>4/26/2019</a:t>
+              <a:t>4/27/2019</a:t>
             </a:fld>
             <a:endParaRPr lang="en-US" dirty="0"/>
           </a:p>
@@ -1168,7 +1168,7 @@
           <a:p>
             <a:fld id="{48A87A34-81AB-432B-8DAE-1953F412C126}" type="datetimeFigureOut">
               <a:rPr lang="en-US" smtClean="0"/>
-              <a:t>4/26/2019</a:t>
+              <a:t>4/27/2019</a:t>
             </a:fld>
             <a:endParaRPr lang="en-US" dirty="0"/>
           </a:p>
@@ -1436,7 +1436,7 @@
           <a:p>
             <a:fld id="{48A87A34-81AB-432B-8DAE-1953F412C126}" type="datetimeFigureOut">
               <a:rPr lang="en-US" smtClean="0"/>
-              <a:t>4/26/2019</a:t>
+              <a:t>4/27/2019</a:t>
             </a:fld>
             <a:endParaRPr lang="en-US" dirty="0"/>
           </a:p>
@@ -1852,7 +1852,7 @@
           <a:p>
             <a:fld id="{48A87A34-81AB-432B-8DAE-1953F412C126}" type="datetimeFigureOut">
               <a:rPr lang="en-US" smtClean="0"/>
-              <a:t>4/26/2019</a:t>
+              <a:t>4/27/2019</a:t>
             </a:fld>
             <a:endParaRPr lang="en-US" dirty="0"/>
           </a:p>
@@ -2001,7 +2001,7 @@
           <a:p>
             <a:fld id="{48A87A34-81AB-432B-8DAE-1953F412C126}" type="datetimeFigureOut">
               <a:rPr lang="en-US" smtClean="0"/>
-              <a:t>4/26/2019</a:t>
+              <a:t>4/27/2019</a:t>
             </a:fld>
             <a:endParaRPr lang="en-US" dirty="0"/>
           </a:p>
@@ -2127,7 +2127,7 @@
           <a:p>
             <a:fld id="{48A87A34-81AB-432B-8DAE-1953F412C126}" type="datetimeFigureOut">
               <a:rPr lang="en-US" smtClean="0"/>
-              <a:t>4/26/2019</a:t>
+              <a:t>4/27/2019</a:t>
             </a:fld>
             <a:endParaRPr lang="en-US" dirty="0"/>
           </a:p>
@@ -2378,7 +2378,7 @@
           <a:p>
             <a:fld id="{48A87A34-81AB-432B-8DAE-1953F412C126}" type="datetimeFigureOut">
               <a:rPr lang="en-US" smtClean="0"/>
-              <a:t>4/26/2019</a:t>
+              <a:t>4/27/2019</a:t>
             </a:fld>
             <a:endParaRPr lang="en-US" dirty="0"/>
           </a:p>
@@ -2823,7 +2823,7 @@
           <a:p>
             <a:fld id="{48A87A34-81AB-432B-8DAE-1953F412C126}" type="datetimeFigureOut">
               <a:rPr lang="en-US" smtClean="0"/>
-              <a:t>4/26/2019</a:t>
+              <a:t>4/27/2019</a:t>
             </a:fld>
             <a:endParaRPr lang="en-US" dirty="0"/>
           </a:p>
@@ -3151,7 +3151,7 @@
             <a:fld id="{48A87A34-81AB-432B-8DAE-1953F412C126}" type="datetimeFigureOut">
               <a:rPr lang="en-US" smtClean="0"/>
               <a:pPr/>
-              <a:t>4/26/2019</a:t>
+              <a:t>4/27/2019</a:t>
             </a:fld>
             <a:endParaRPr lang="en-US" dirty="0"/>
           </a:p>
@@ -3654,7 +3654,12 @@
             <p:ph type="ctrTitle"/>
           </p:nvPr>
         </p:nvSpPr>
-        <p:spPr/>
+        <p:spPr>
+          <a:xfrm>
+            <a:off x="2417779" y="802298"/>
+            <a:ext cx="8637073" cy="2541431"/>
+          </a:xfrm>
+        </p:spPr>
         <p:txBody>
           <a:bodyPr>
             <a:normAutofit/>
@@ -3670,7 +3675,7 @@
             </a:br>
             <a:r>
               <a:rPr lang="en-IN" sz="8800" dirty="0"/>
-              <a:t>Azure CLI</a:t>
+              <a:t>    Azure CLI</a:t>
             </a:r>
             <a:endParaRPr lang="en-IN" dirty="0"/>
           </a:p>
@@ -3704,6 +3709,45 @@
           </a:p>
         </p:txBody>
       </p:sp>
+      <p:pic>
+        <p:nvPicPr>
+          <p:cNvPr id="4" name="Graphic 3">
+            <a:extLst>
+              <a:ext uri="{FF2B5EF4-FFF2-40B4-BE49-F238E27FC236}">
+                <a16:creationId xmlns:a16="http://schemas.microsoft.com/office/drawing/2014/main" id="{E29AA718-0DF7-4962-8B4F-EED74A0B1D8B}"/>
+              </a:ext>
+            </a:extLst>
+          </p:cNvPr>
+          <p:cNvPicPr>
+            <a:picLocks noChangeAspect="1"/>
+          </p:cNvPicPr>
+          <p:nvPr/>
+        </p:nvPicPr>
+        <p:blipFill>
+          <a:blip r:embed="rId2">
+            <a:extLst>
+              <a:ext uri="{28A0092B-C50C-407E-A947-70E740481C1C}">
+                <a14:useLocalDpi xmlns:a14="http://schemas.microsoft.com/office/drawing/2010/main" val="0"/>
+              </a:ext>
+              <a:ext uri="{96DAC541-7B7A-43D3-8B79-37D633B846F1}">
+                <asvg:svgBlip xmlns:asvg="http://schemas.microsoft.com/office/drawing/2016/SVG/main" r:embed="rId3"/>
+              </a:ext>
+            </a:extLst>
+          </a:blip>
+          <a:stretch>
+            <a:fillRect/>
+          </a:stretch>
+        </p:blipFill>
+        <p:spPr>
+          <a:xfrm>
+            <a:off x="2480123" y="2225444"/>
+            <a:ext cx="893865" cy="893865"/>
+          </a:xfrm>
+          <a:prstGeom prst="rect">
+            <a:avLst/>
+          </a:prstGeom>
+        </p:spPr>
+      </p:pic>
     </p:spTree>
     <p:extLst>
       <p:ext uri="{BB962C8B-B14F-4D97-AF65-F5344CB8AC3E}">

</xml_diff>